<commit_message>
update with urls and understanding power
</commit_message>
<xml_diff>
--- a/Beyond the P-Value.pptx
+++ b/Beyond the P-Value.pptx
@@ -272,7 +272,7 @@
           <a:p>
             <a:fld id="{5B4D735E-FF2B-4F2C-B387-0C10F724C3FF}" type="datetimeFigureOut">
               <a:rPr lang="en-US" smtClean="0"/>
-              <a:t>1/11/2019</a:t>
+              <a:t>1/16/2019</a:t>
             </a:fld>
             <a:endParaRPr lang="en-US"/>
           </a:p>
@@ -713,6 +713,98 @@
           <a:p>
             <a:fld id="{2E0A6CDD-7EB5-4CA4-848D-7292B55DA744}" type="slidenum">
               <a:rPr lang="en-US" smtClean="0"/>
+              <a:t>18</a:t>
+            </a:fld>
+            <a:endParaRPr lang="en-US"/>
+          </a:p>
+        </p:txBody>
+      </p:sp>
+    </p:spTree>
+    <p:extLst>
+      <p:ext uri="{BB962C8B-B14F-4D97-AF65-F5344CB8AC3E}">
+        <p14:creationId xmlns:p14="http://schemas.microsoft.com/office/powerpoint/2010/main" val="864461149"/>
+      </p:ext>
+    </p:extLst>
+  </p:cSld>
+  <p:clrMapOvr>
+    <a:masterClrMapping/>
+  </p:clrMapOvr>
+</p:notes>
+</file>
+
+<file path=ppt/notesSlides/notesSlide11.xml><?xml version="1.0" encoding="utf-8"?>
+<p:notes xmlns:a="http://schemas.openxmlformats.org/drawingml/2006/main" xmlns:r="http://schemas.openxmlformats.org/officeDocument/2006/relationships" xmlns:p="http://schemas.openxmlformats.org/presentationml/2006/main">
+  <p:cSld>
+    <p:spTree>
+      <p:nvGrpSpPr>
+        <p:cNvPr id="1" name=""/>
+        <p:cNvGrpSpPr/>
+        <p:nvPr/>
+      </p:nvGrpSpPr>
+      <p:grpSpPr>
+        <a:xfrm>
+          <a:off x="0" y="0"/>
+          <a:ext cx="0" cy="0"/>
+          <a:chOff x="0" y="0"/>
+          <a:chExt cx="0" cy="0"/>
+        </a:xfrm>
+      </p:grpSpPr>
+      <p:sp>
+        <p:nvSpPr>
+          <p:cNvPr id="2" name="Slide Image Placeholder 1"/>
+          <p:cNvSpPr>
+            <a:spLocks noGrp="1" noRot="1" noChangeAspect="1"/>
+          </p:cNvSpPr>
+          <p:nvPr>
+            <p:ph type="sldImg"/>
+          </p:nvPr>
+        </p:nvSpPr>
+        <p:spPr/>
+      </p:sp>
+      <p:sp>
+        <p:nvSpPr>
+          <p:cNvPr id="3" name="Notes Placeholder 2"/>
+          <p:cNvSpPr>
+            <a:spLocks noGrp="1"/>
+          </p:cNvSpPr>
+          <p:nvPr>
+            <p:ph type="body" idx="1"/>
+          </p:nvPr>
+        </p:nvSpPr>
+        <p:spPr/>
+        <p:txBody>
+          <a:bodyPr/>
+          <a:lstStyle/>
+          <a:p>
+            <a:r>
+              <a:rPr lang="en-US" dirty="0" smtClean="0"/>
+              <a:t>Where</a:t>
+            </a:r>
+            <a:r>
+              <a:rPr lang="en-US" baseline="0" dirty="0" smtClean="0"/>
+              <a:t> does most of your research fall?</a:t>
+            </a:r>
+            <a:endParaRPr lang="en-US" dirty="0"/>
+          </a:p>
+        </p:txBody>
+      </p:sp>
+      <p:sp>
+        <p:nvSpPr>
+          <p:cNvPr id="4" name="Slide Number Placeholder 3"/>
+          <p:cNvSpPr>
+            <a:spLocks noGrp="1"/>
+          </p:cNvSpPr>
+          <p:nvPr>
+            <p:ph type="sldNum" sz="quarter" idx="10"/>
+          </p:nvPr>
+        </p:nvSpPr>
+        <p:spPr/>
+        <p:txBody>
+          <a:bodyPr/>
+          <a:lstStyle/>
+          <a:p>
+            <a:fld id="{2E0A6CDD-7EB5-4CA4-848D-7292B55DA744}" type="slidenum">
+              <a:rPr lang="en-US" smtClean="0"/>
               <a:t>19</a:t>
             </a:fld>
             <a:endParaRPr lang="en-US"/>
@@ -732,7 +824,7 @@
 </p:notes>
 </file>
 
-<file path=ppt/notesSlides/notesSlide11.xml><?xml version="1.0" encoding="utf-8"?>
+<file path=ppt/notesSlides/notesSlide12.xml><?xml version="1.0" encoding="utf-8"?>
 <p:notes xmlns:a="http://schemas.openxmlformats.org/drawingml/2006/main" xmlns:r="http://schemas.openxmlformats.org/officeDocument/2006/relationships" xmlns:p="http://schemas.openxmlformats.org/presentationml/2006/main">
   <p:cSld>
     <p:spTree>
@@ -1128,6 +1220,90 @@
           <a:bodyPr/>
           <a:lstStyle/>
           <a:p>
+            <a:endParaRPr lang="en-US" dirty="0"/>
+          </a:p>
+        </p:txBody>
+      </p:sp>
+      <p:sp>
+        <p:nvSpPr>
+          <p:cNvPr id="4" name="Slide Number Placeholder 3"/>
+          <p:cNvSpPr>
+            <a:spLocks noGrp="1"/>
+          </p:cNvSpPr>
+          <p:nvPr>
+            <p:ph type="sldNum" sz="quarter" idx="10"/>
+          </p:nvPr>
+        </p:nvSpPr>
+        <p:spPr/>
+        <p:txBody>
+          <a:bodyPr/>
+          <a:lstStyle/>
+          <a:p>
+            <a:fld id="{2E0A6CDD-7EB5-4CA4-848D-7292B55DA744}" type="slidenum">
+              <a:rPr lang="en-US" smtClean="0"/>
+              <a:t>7</a:t>
+            </a:fld>
+            <a:endParaRPr lang="en-US"/>
+          </a:p>
+        </p:txBody>
+      </p:sp>
+    </p:spTree>
+    <p:extLst>
+      <p:ext uri="{BB962C8B-B14F-4D97-AF65-F5344CB8AC3E}">
+        <p14:creationId xmlns:p14="http://schemas.microsoft.com/office/powerpoint/2010/main" val="4116331218"/>
+      </p:ext>
+    </p:extLst>
+  </p:cSld>
+  <p:clrMapOvr>
+    <a:masterClrMapping/>
+  </p:clrMapOvr>
+</p:notes>
+</file>
+
+<file path=ppt/notesSlides/notesSlide6.xml><?xml version="1.0" encoding="utf-8"?>
+<p:notes xmlns:a="http://schemas.openxmlformats.org/drawingml/2006/main" xmlns:r="http://schemas.openxmlformats.org/officeDocument/2006/relationships" xmlns:p="http://schemas.openxmlformats.org/presentationml/2006/main">
+  <p:cSld>
+    <p:spTree>
+      <p:nvGrpSpPr>
+        <p:cNvPr id="1" name=""/>
+        <p:cNvGrpSpPr/>
+        <p:nvPr/>
+      </p:nvGrpSpPr>
+      <p:grpSpPr>
+        <a:xfrm>
+          <a:off x="0" y="0"/>
+          <a:ext cx="0" cy="0"/>
+          <a:chOff x="0" y="0"/>
+          <a:chExt cx="0" cy="0"/>
+        </a:xfrm>
+      </p:grpSpPr>
+      <p:sp>
+        <p:nvSpPr>
+          <p:cNvPr id="2" name="Slide Image Placeholder 1"/>
+          <p:cNvSpPr>
+            <a:spLocks noGrp="1" noRot="1" noChangeAspect="1"/>
+          </p:cNvSpPr>
+          <p:nvPr>
+            <p:ph type="sldImg"/>
+          </p:nvPr>
+        </p:nvSpPr>
+        <p:spPr/>
+      </p:sp>
+      <p:sp>
+        <p:nvSpPr>
+          <p:cNvPr id="3" name="Notes Placeholder 2"/>
+          <p:cNvSpPr>
+            <a:spLocks noGrp="1"/>
+          </p:cNvSpPr>
+          <p:nvPr>
+            <p:ph type="body" idx="1"/>
+          </p:nvPr>
+        </p:nvSpPr>
+        <p:spPr/>
+        <p:txBody>
+          <a:bodyPr/>
+          <a:lstStyle/>
+          <a:p>
             <a:r>
               <a:rPr lang="en-US" dirty="0" smtClean="0"/>
               <a:t>Transition</a:t>
@@ -1178,7 +1354,7 @@
 </p:notes>
 </file>
 
-<file path=ppt/notesSlides/notesSlide6.xml><?xml version="1.0" encoding="utf-8"?>
+<file path=ppt/notesSlides/notesSlide7.xml><?xml version="1.0" encoding="utf-8"?>
 <p:notes xmlns:a="http://schemas.openxmlformats.org/drawingml/2006/main" xmlns:r="http://schemas.openxmlformats.org/officeDocument/2006/relationships" xmlns:p="http://schemas.openxmlformats.org/presentationml/2006/main">
   <p:cSld>
     <p:spTree>
@@ -1270,7 +1446,7 @@
 </p:notes>
 </file>
 
-<file path=ppt/notesSlides/notesSlide7.xml><?xml version="1.0" encoding="utf-8"?>
+<file path=ppt/notesSlides/notesSlide8.xml><?xml version="1.0" encoding="utf-8"?>
 <p:notes xmlns:a="http://schemas.openxmlformats.org/drawingml/2006/main" xmlns:r="http://schemas.openxmlformats.org/officeDocument/2006/relationships" xmlns:p="http://schemas.openxmlformats.org/presentationml/2006/main">
   <p:cSld>
     <p:spTree>
@@ -1371,7 +1547,7 @@
 </p:notes>
 </file>
 
-<file path=ppt/notesSlides/notesSlide8.xml><?xml version="1.0" encoding="utf-8"?>
+<file path=ppt/notesSlides/notesSlide9.xml><?xml version="1.0" encoding="utf-8"?>
 <p:notes xmlns:a="http://schemas.openxmlformats.org/drawingml/2006/main" xmlns:r="http://schemas.openxmlformats.org/officeDocument/2006/relationships" xmlns:p="http://schemas.openxmlformats.org/presentationml/2006/main">
   <p:cSld>
     <p:spTree>
@@ -1446,98 +1622,6 @@
     <p:extLst>
       <p:ext uri="{BB962C8B-B14F-4D97-AF65-F5344CB8AC3E}">
         <p14:creationId xmlns:p14="http://schemas.microsoft.com/office/powerpoint/2010/main" val="2558614093"/>
-      </p:ext>
-    </p:extLst>
-  </p:cSld>
-  <p:clrMapOvr>
-    <a:masterClrMapping/>
-  </p:clrMapOvr>
-</p:notes>
-</file>
-
-<file path=ppt/notesSlides/notesSlide9.xml><?xml version="1.0" encoding="utf-8"?>
-<p:notes xmlns:a="http://schemas.openxmlformats.org/drawingml/2006/main" xmlns:r="http://schemas.openxmlformats.org/officeDocument/2006/relationships" xmlns:p="http://schemas.openxmlformats.org/presentationml/2006/main">
-  <p:cSld>
-    <p:spTree>
-      <p:nvGrpSpPr>
-        <p:cNvPr id="1" name=""/>
-        <p:cNvGrpSpPr/>
-        <p:nvPr/>
-      </p:nvGrpSpPr>
-      <p:grpSpPr>
-        <a:xfrm>
-          <a:off x="0" y="0"/>
-          <a:ext cx="0" cy="0"/>
-          <a:chOff x="0" y="0"/>
-          <a:chExt cx="0" cy="0"/>
-        </a:xfrm>
-      </p:grpSpPr>
-      <p:sp>
-        <p:nvSpPr>
-          <p:cNvPr id="2" name="Slide Image Placeholder 1"/>
-          <p:cNvSpPr>
-            <a:spLocks noGrp="1" noRot="1" noChangeAspect="1"/>
-          </p:cNvSpPr>
-          <p:nvPr>
-            <p:ph type="sldImg"/>
-          </p:nvPr>
-        </p:nvSpPr>
-        <p:spPr/>
-      </p:sp>
-      <p:sp>
-        <p:nvSpPr>
-          <p:cNvPr id="3" name="Notes Placeholder 2"/>
-          <p:cNvSpPr>
-            <a:spLocks noGrp="1"/>
-          </p:cNvSpPr>
-          <p:nvPr>
-            <p:ph type="body" idx="1"/>
-          </p:nvPr>
-        </p:nvSpPr>
-        <p:spPr/>
-        <p:txBody>
-          <a:bodyPr/>
-          <a:lstStyle/>
-          <a:p>
-            <a:r>
-              <a:rPr lang="en-US" dirty="0" smtClean="0"/>
-              <a:t>Where</a:t>
-            </a:r>
-            <a:r>
-              <a:rPr lang="en-US" baseline="0" dirty="0" smtClean="0"/>
-              <a:t> does most of your research fall?</a:t>
-            </a:r>
-            <a:endParaRPr lang="en-US" dirty="0"/>
-          </a:p>
-        </p:txBody>
-      </p:sp>
-      <p:sp>
-        <p:nvSpPr>
-          <p:cNvPr id="4" name="Slide Number Placeholder 3"/>
-          <p:cNvSpPr>
-            <a:spLocks noGrp="1"/>
-          </p:cNvSpPr>
-          <p:nvPr>
-            <p:ph type="sldNum" sz="quarter" idx="10"/>
-          </p:nvPr>
-        </p:nvSpPr>
-        <p:spPr/>
-        <p:txBody>
-          <a:bodyPr/>
-          <a:lstStyle/>
-          <a:p>
-            <a:fld id="{2E0A6CDD-7EB5-4CA4-848D-7292B55DA744}" type="slidenum">
-              <a:rPr lang="en-US" smtClean="0"/>
-              <a:t>18</a:t>
-            </a:fld>
-            <a:endParaRPr lang="en-US"/>
-          </a:p>
-        </p:txBody>
-      </p:sp>
-    </p:spTree>
-    <p:extLst>
-      <p:ext uri="{BB962C8B-B14F-4D97-AF65-F5344CB8AC3E}">
-        <p14:creationId xmlns:p14="http://schemas.microsoft.com/office/powerpoint/2010/main" val="864461149"/>
       </p:ext>
     </p:extLst>
   </p:cSld>
@@ -10340,7 +10424,7 @@
           <a:p>
             <a:fld id="{88EE5525-E8FD-4960-9983-7CCD6AC1DAB7}" type="datetime1">
               <a:rPr lang="en-US" smtClean="0"/>
-              <a:t>1/11/2019</a:t>
+              <a:t>1/16/2019</a:t>
             </a:fld>
             <a:endParaRPr lang="en-US"/>
           </a:p>
@@ -10567,7 +10651,7 @@
           <a:p>
             <a:fld id="{C2DB710E-975F-4823-B8D2-19CB838134C9}" type="datetime1">
               <a:rPr lang="en-US" smtClean="0"/>
-              <a:t>1/11/2019</a:t>
+              <a:t>1/16/2019</a:t>
             </a:fld>
             <a:endParaRPr lang="en-US"/>
           </a:p>
@@ -10751,7 +10835,7 @@
           <a:p>
             <a:fld id="{F2635D49-5073-432F-B357-DE77A9FED238}" type="datetime1">
               <a:rPr lang="en-US" smtClean="0"/>
-              <a:t>1/11/2019</a:t>
+              <a:t>1/16/2019</a:t>
             </a:fld>
             <a:endParaRPr lang="en-US"/>
           </a:p>
@@ -10986,7 +11070,7 @@
           <a:p>
             <a:fld id="{50860A5E-F1AC-41A8-83BB-B581D83362C0}" type="datetime1">
               <a:rPr lang="en-US" smtClean="0"/>
-              <a:t>1/11/2019</a:t>
+              <a:t>1/16/2019</a:t>
             </a:fld>
             <a:endParaRPr lang="en-US"/>
           </a:p>
@@ -19904,7 +19988,7 @@
           <a:p>
             <a:fld id="{FD1BC067-A27C-47F5-9607-CBCCE5FA7D31}" type="datetime1">
               <a:rPr lang="en-US" smtClean="0"/>
-              <a:t>1/11/2019</a:t>
+              <a:t>1/16/2019</a:t>
             </a:fld>
             <a:endParaRPr lang="en-US"/>
           </a:p>
@@ -20198,7 +20282,7 @@
           <a:p>
             <a:fld id="{70D4EDFA-A56A-46D7-ADA1-1FFF5186F60D}" type="datetime1">
               <a:rPr lang="en-US" smtClean="0"/>
-              <a:t>1/11/2019</a:t>
+              <a:t>1/16/2019</a:t>
             </a:fld>
             <a:endParaRPr lang="en-US"/>
           </a:p>
@@ -20607,7 +20691,7 @@
           <a:p>
             <a:fld id="{767157F7-F041-4B9B-B232-533A7DDD06FD}" type="datetime1">
               <a:rPr lang="en-US" smtClean="0"/>
-              <a:t>1/11/2019</a:t>
+              <a:t>1/16/2019</a:t>
             </a:fld>
             <a:endParaRPr lang="en-US"/>
           </a:p>
@@ -20736,7 +20820,7 @@
           <a:p>
             <a:fld id="{0B6A0657-F110-4D73-B5B1-EE2ADBE71D94}" type="datetime1">
               <a:rPr lang="en-US" smtClean="0"/>
-              <a:t>1/11/2019</a:t>
+              <a:t>1/16/2019</a:t>
             </a:fld>
             <a:endParaRPr lang="en-US"/>
           </a:p>
@@ -20842,7 +20926,7 @@
           <a:p>
             <a:fld id="{13DC128E-3973-4DBB-B04E-088A657002EF}" type="datetime1">
               <a:rPr lang="en-US" smtClean="0"/>
-              <a:t>1/11/2019</a:t>
+              <a:t>1/16/2019</a:t>
             </a:fld>
             <a:endParaRPr lang="en-US"/>
           </a:p>
@@ -21136,7 +21220,7 @@
           <a:p>
             <a:fld id="{2EBD0036-ED30-4311-9E85-DFE1BE3908C9}" type="datetime1">
               <a:rPr lang="en-US" smtClean="0"/>
-              <a:t>1/11/2019</a:t>
+              <a:t>1/16/2019</a:t>
             </a:fld>
             <a:endParaRPr lang="en-US"/>
           </a:p>
@@ -21420,7 +21504,7 @@
           <a:p>
             <a:fld id="{16618C25-6C29-4B65-AD15-CF70FEA92D21}" type="datetime1">
               <a:rPr lang="en-US" smtClean="0"/>
-              <a:t>1/11/2019</a:t>
+              <a:t>1/16/2019</a:t>
             </a:fld>
             <a:endParaRPr lang="en-US"/>
           </a:p>
@@ -21674,7 +21758,7 @@
           <a:p>
             <a:fld id="{3DCE7BD7-4D8A-48BB-BC4B-D89DF1351AB3}" type="datetime1">
               <a:rPr lang="en-US" smtClean="0"/>
-              <a:t>1/11/2019</a:t>
+              <a:t>1/16/2019</a:t>
             </a:fld>
             <a:endParaRPr lang="en-US"/>
           </a:p>
@@ -22482,7 +22566,7 @@
           <a:p>
             <a:r>
               <a:rPr lang="en-US" dirty="0" smtClean="0"/>
-              <a:t>Probability of getting a result at least as big as what we observed</a:t>
+              <a:t>Probability of getting a result at least as big as what we observed, UNDER THE NULL HYPOTHESIS</a:t>
             </a:r>
           </a:p>
           <a:p>
@@ -23322,6 +23406,13 @@
   <p:clrMapOvr>
     <a:masterClrMapping/>
   </p:clrMapOvr>
+  <p:timing>
+    <p:tnLst>
+      <p:par>
+        <p:cTn id="1" dur="indefinite" restart="never" nodeType="tmRoot"/>
+      </p:par>
+    </p:tnLst>
+  </p:timing>
 </p:sld>
 </file>
 
@@ -24887,7 +24978,7 @@
         </p:nvSpPr>
         <p:spPr>
           <a:xfrm>
-            <a:off x="1024128" y="6396335"/>
+            <a:off x="1147220" y="123551"/>
             <a:ext cx="9776866" cy="461665"/>
           </a:xfrm>
           <a:prstGeom prst="rect">
@@ -24975,6 +25066,13 @@
   <p:clrMapOvr>
     <a:masterClrMapping/>
   </p:clrMapOvr>
+  <p:timing>
+    <p:tnLst>
+      <p:par>
+        <p:cTn id="1" dur="indefinite" restart="never" nodeType="tmRoot"/>
+      </p:par>
+    </p:tnLst>
+  </p:timing>
 </p:sld>
 </file>
 
@@ -27543,6 +27641,13 @@
   <p:clrMapOvr>
     <a:masterClrMapping/>
   </p:clrMapOvr>
+  <p:timing>
+    <p:tnLst>
+      <p:par>
+        <p:cTn id="1" dur="indefinite" restart="never" nodeType="tmRoot"/>
+      </p:par>
+    </p:tnLst>
+  </p:timing>
 </p:sld>
 </file>
 
@@ -27732,6 +27837,13 @@
   <p:clrMapOvr>
     <a:masterClrMapping/>
   </p:clrMapOvr>
+  <p:timing>
+    <p:tnLst>
+      <p:par>
+        <p:cTn id="1" dur="indefinite" restart="never" nodeType="tmRoot"/>
+      </p:par>
+    </p:tnLst>
+  </p:timing>
 </p:sld>
 </file>
 
@@ -29962,7 +30074,7 @@
           <p:nvPr/>
         </p:nvPicPr>
         <p:blipFill>
-          <a:blip r:embed="rId2"/>
+          <a:blip r:embed="rId3"/>
           <a:stretch>
             <a:fillRect/>
           </a:stretch>
@@ -29986,7 +30098,7 @@
           <p:nvPr/>
         </p:nvPicPr>
         <p:blipFill>
-          <a:blip r:embed="rId3"/>
+          <a:blip r:embed="rId4"/>
           <a:stretch>
             <a:fillRect/>
           </a:stretch>
@@ -30044,7 +30156,7 @@
           <p:nvPr/>
         </p:nvPicPr>
         <p:blipFill>
-          <a:blip r:embed="rId2"/>
+          <a:blip r:embed="rId3"/>
           <a:stretch>
             <a:fillRect/>
           </a:stretch>
@@ -30068,7 +30180,7 @@
           <p:nvPr/>
         </p:nvPicPr>
         <p:blipFill>
-          <a:blip r:embed="rId3"/>
+          <a:blip r:embed="rId4"/>
           <a:stretch>
             <a:fillRect/>
           </a:stretch>
@@ -30106,14 +30218,11 @@
           <a:lstStyle/>
           <a:p>
             <a:r>
-              <a:rPr lang="en-US" sz="9600" dirty="0" smtClean="0">
+              <a:rPr lang="en-US" sz="9600" dirty="0">
                 <a:latin typeface="+mj-lt"/>
               </a:rPr>
-              <a:t>&gt;</a:t>
+              <a:t>&lt;</a:t>
             </a:r>
-            <a:endParaRPr lang="en-US" sz="9600" dirty="0">
-              <a:latin typeface="+mj-lt"/>
-            </a:endParaRPr>
           </a:p>
         </p:txBody>
       </p:sp>

</xml_diff>